<commit_message>
Add one point for reporting
</commit_message>
<xml_diff>
--- a/Orange/doc/task01/Task 1.pptx
+++ b/Orange/doc/task01/Task 1.pptx
@@ -108,6 +108,11 @@
       </a:defRPr>
     </a:lvl9pPr>
   </p:defaultTextStyle>
+  <p:extLst>
+    <p:ext uri="{EFAFB233-063F-42B5-8137-9DF3F51BA10A}">
+      <p15:sldGuideLst xmlns:p15="http://schemas.microsoft.com/office/powerpoint/2012/main"/>
+    </p:ext>
+  </p:extLst>
 </p:presentation>
 </file>
 
@@ -242,7 +247,7 @@
           <a:p>
             <a:fld id="{E5AAD6E2-5484-4EBC-A02E-81EA354BFAF7}" type="datetimeFigureOut">
               <a:rPr lang="de-CH" smtClean="0"/>
-              <a:t>02.03.2017</a:t>
+              <a:t>03.03.2017</a:t>
             </a:fld>
             <a:endParaRPr lang="de-CH"/>
           </a:p>
@@ -284,7 +289,7 @@
           <a:p>
             <a:fld id="{3A1B43E4-5F6C-441B-BBDB-774BAF3BA33A}" type="slidenum">
               <a:rPr lang="de-CH" smtClean="0"/>
-              <a:t>‹#›</a:t>
+              <a:t>‹Nr.›</a:t>
             </a:fld>
             <a:endParaRPr lang="de-CH"/>
           </a:p>
@@ -412,7 +417,7 @@
           <a:p>
             <a:fld id="{E5AAD6E2-5484-4EBC-A02E-81EA354BFAF7}" type="datetimeFigureOut">
               <a:rPr lang="de-CH" smtClean="0"/>
-              <a:t>02.03.2017</a:t>
+              <a:t>03.03.2017</a:t>
             </a:fld>
             <a:endParaRPr lang="de-CH"/>
           </a:p>
@@ -454,7 +459,7 @@
           <a:p>
             <a:fld id="{3A1B43E4-5F6C-441B-BBDB-774BAF3BA33A}" type="slidenum">
               <a:rPr lang="de-CH" smtClean="0"/>
-              <a:t>‹#›</a:t>
+              <a:t>‹Nr.›</a:t>
             </a:fld>
             <a:endParaRPr lang="de-CH"/>
           </a:p>
@@ -592,7 +597,7 @@
           <a:p>
             <a:fld id="{E5AAD6E2-5484-4EBC-A02E-81EA354BFAF7}" type="datetimeFigureOut">
               <a:rPr lang="de-CH" smtClean="0"/>
-              <a:t>02.03.2017</a:t>
+              <a:t>03.03.2017</a:t>
             </a:fld>
             <a:endParaRPr lang="de-CH"/>
           </a:p>
@@ -634,7 +639,7 @@
           <a:p>
             <a:fld id="{3A1B43E4-5F6C-441B-BBDB-774BAF3BA33A}" type="slidenum">
               <a:rPr lang="de-CH" smtClean="0"/>
-              <a:t>‹#›</a:t>
+              <a:t>‹Nr.›</a:t>
             </a:fld>
             <a:endParaRPr lang="de-CH"/>
           </a:p>
@@ -762,7 +767,7 @@
           <a:p>
             <a:fld id="{E5AAD6E2-5484-4EBC-A02E-81EA354BFAF7}" type="datetimeFigureOut">
               <a:rPr lang="de-CH" smtClean="0"/>
-              <a:t>02.03.2017</a:t>
+              <a:t>03.03.2017</a:t>
             </a:fld>
             <a:endParaRPr lang="de-CH"/>
           </a:p>
@@ -804,7 +809,7 @@
           <a:p>
             <a:fld id="{3A1B43E4-5F6C-441B-BBDB-774BAF3BA33A}" type="slidenum">
               <a:rPr lang="de-CH" smtClean="0"/>
-              <a:t>‹#›</a:t>
+              <a:t>‹Nr.›</a:t>
             </a:fld>
             <a:endParaRPr lang="de-CH"/>
           </a:p>
@@ -1008,7 +1013,7 @@
           <a:p>
             <a:fld id="{E5AAD6E2-5484-4EBC-A02E-81EA354BFAF7}" type="datetimeFigureOut">
               <a:rPr lang="de-CH" smtClean="0"/>
-              <a:t>02.03.2017</a:t>
+              <a:t>03.03.2017</a:t>
             </a:fld>
             <a:endParaRPr lang="de-CH"/>
           </a:p>
@@ -1050,7 +1055,7 @@
           <a:p>
             <a:fld id="{3A1B43E4-5F6C-441B-BBDB-774BAF3BA33A}" type="slidenum">
               <a:rPr lang="de-CH" smtClean="0"/>
-              <a:t>‹#›</a:t>
+              <a:t>‹Nr.›</a:t>
             </a:fld>
             <a:endParaRPr lang="de-CH"/>
           </a:p>
@@ -1240,7 +1245,7 @@
           <a:p>
             <a:fld id="{E5AAD6E2-5484-4EBC-A02E-81EA354BFAF7}" type="datetimeFigureOut">
               <a:rPr lang="de-CH" smtClean="0"/>
-              <a:t>02.03.2017</a:t>
+              <a:t>03.03.2017</a:t>
             </a:fld>
             <a:endParaRPr lang="de-CH"/>
           </a:p>
@@ -1282,7 +1287,7 @@
           <a:p>
             <a:fld id="{3A1B43E4-5F6C-441B-BBDB-774BAF3BA33A}" type="slidenum">
               <a:rPr lang="de-CH" smtClean="0"/>
-              <a:t>‹#›</a:t>
+              <a:t>‹Nr.›</a:t>
             </a:fld>
             <a:endParaRPr lang="de-CH"/>
           </a:p>
@@ -1607,7 +1612,7 @@
           <a:p>
             <a:fld id="{E5AAD6E2-5484-4EBC-A02E-81EA354BFAF7}" type="datetimeFigureOut">
               <a:rPr lang="de-CH" smtClean="0"/>
-              <a:t>02.03.2017</a:t>
+              <a:t>03.03.2017</a:t>
             </a:fld>
             <a:endParaRPr lang="de-CH"/>
           </a:p>
@@ -1649,7 +1654,7 @@
           <a:p>
             <a:fld id="{3A1B43E4-5F6C-441B-BBDB-774BAF3BA33A}" type="slidenum">
               <a:rPr lang="de-CH" smtClean="0"/>
-              <a:t>‹#›</a:t>
+              <a:t>‹Nr.›</a:t>
             </a:fld>
             <a:endParaRPr lang="de-CH"/>
           </a:p>
@@ -1725,7 +1730,7 @@
           <a:p>
             <a:fld id="{E5AAD6E2-5484-4EBC-A02E-81EA354BFAF7}" type="datetimeFigureOut">
               <a:rPr lang="de-CH" smtClean="0"/>
-              <a:t>02.03.2017</a:t>
+              <a:t>03.03.2017</a:t>
             </a:fld>
             <a:endParaRPr lang="de-CH"/>
           </a:p>
@@ -1767,7 +1772,7 @@
           <a:p>
             <a:fld id="{3A1B43E4-5F6C-441B-BBDB-774BAF3BA33A}" type="slidenum">
               <a:rPr lang="de-CH" smtClean="0"/>
-              <a:t>‹#›</a:t>
+              <a:t>‹Nr.›</a:t>
             </a:fld>
             <a:endParaRPr lang="de-CH"/>
           </a:p>
@@ -1820,7 +1825,7 @@
           <a:p>
             <a:fld id="{E5AAD6E2-5484-4EBC-A02E-81EA354BFAF7}" type="datetimeFigureOut">
               <a:rPr lang="de-CH" smtClean="0"/>
-              <a:t>02.03.2017</a:t>
+              <a:t>03.03.2017</a:t>
             </a:fld>
             <a:endParaRPr lang="de-CH"/>
           </a:p>
@@ -1862,7 +1867,7 @@
           <a:p>
             <a:fld id="{3A1B43E4-5F6C-441B-BBDB-774BAF3BA33A}" type="slidenum">
               <a:rPr lang="de-CH" smtClean="0"/>
-              <a:t>‹#›</a:t>
+              <a:t>‹Nr.›</a:t>
             </a:fld>
             <a:endParaRPr lang="de-CH"/>
           </a:p>
@@ -2097,7 +2102,7 @@
           <a:p>
             <a:fld id="{E5AAD6E2-5484-4EBC-A02E-81EA354BFAF7}" type="datetimeFigureOut">
               <a:rPr lang="de-CH" smtClean="0"/>
-              <a:t>02.03.2017</a:t>
+              <a:t>03.03.2017</a:t>
             </a:fld>
             <a:endParaRPr lang="de-CH"/>
           </a:p>
@@ -2139,7 +2144,7 @@
           <a:p>
             <a:fld id="{3A1B43E4-5F6C-441B-BBDB-774BAF3BA33A}" type="slidenum">
               <a:rPr lang="de-CH" smtClean="0"/>
-              <a:t>‹#›</a:t>
+              <a:t>‹Nr.›</a:t>
             </a:fld>
             <a:endParaRPr lang="de-CH"/>
           </a:p>
@@ -2350,7 +2355,7 @@
           <a:p>
             <a:fld id="{E5AAD6E2-5484-4EBC-A02E-81EA354BFAF7}" type="datetimeFigureOut">
               <a:rPr lang="de-CH" smtClean="0"/>
-              <a:t>02.03.2017</a:t>
+              <a:t>03.03.2017</a:t>
             </a:fld>
             <a:endParaRPr lang="de-CH"/>
           </a:p>
@@ -2392,7 +2397,7 @@
           <a:p>
             <a:fld id="{3A1B43E4-5F6C-441B-BBDB-774BAF3BA33A}" type="slidenum">
               <a:rPr lang="de-CH" smtClean="0"/>
-              <a:t>‹#›</a:t>
+              <a:t>‹Nr.›</a:t>
             </a:fld>
             <a:endParaRPr lang="de-CH"/>
           </a:p>
@@ -2563,7 +2568,7 @@
           <a:p>
             <a:fld id="{E5AAD6E2-5484-4EBC-A02E-81EA354BFAF7}" type="datetimeFigureOut">
               <a:rPr lang="de-CH" smtClean="0"/>
-              <a:t>02.03.2017</a:t>
+              <a:t>03.03.2017</a:t>
             </a:fld>
             <a:endParaRPr lang="de-CH"/>
           </a:p>
@@ -2641,7 +2646,7 @@
           <a:p>
             <a:fld id="{3A1B43E4-5F6C-441B-BBDB-774BAF3BA33A}" type="slidenum">
               <a:rPr lang="de-CH" smtClean="0"/>
-              <a:t>‹#›</a:t>
+              <a:t>‹Nr.›</a:t>
             </a:fld>
             <a:endParaRPr lang="de-CH"/>
           </a:p>
@@ -3340,7 +3345,7 @@
         <p:spPr/>
         <p:txBody>
           <a:bodyPr>
-            <a:normAutofit fontScale="85000" lnSpcReduction="20000"/>
+            <a:normAutofit fontScale="77500" lnSpcReduction="20000"/>
           </a:bodyPr>
           <a:lstStyle/>
           <a:p>
@@ -3427,6 +3432,13 @@
             <a:r>
               <a:rPr lang="en-US" dirty="0"/>
               <a:t>Medical reports for doctors</a:t>
+            </a:r>
+          </a:p>
+          <a:p>
+            <a:pPr lvl="1"/>
+            <a:r>
+              <a:rPr lang="en-US" dirty="0"/>
+              <a:t>Statistic reports</a:t>
             </a:r>
           </a:p>
           <a:p>

</xml_diff>